<commit_message>
thêm đánh số trang
</commit_message>
<xml_diff>
--- a/Website-jp-pp.pptx
+++ b/Website-jp-pp.pptx
@@ -1132,7 +1132,7 @@
           <a:p>
             <a:fld id="{23CEAAF3-9831-450B-8D59-2C09DB96C8FC}" type="datetimeFigureOut">
               <a:rPr lang="en-US"/>
-              <a:t>7/14/2020</a:t>
+              <a:t>7/15/2020</a:t>
             </a:fld>
             <a:endParaRPr/>
           </a:p>
@@ -1297,7 +1297,7 @@
           <a:p>
             <a:fld id="{2D50CD79-FC16-4410-AB61-17F26E6D3BC8}" type="datetimeFigureOut">
               <a:rPr lang="en-US"/>
-              <a:t>7/14/2020</a:t>
+              <a:t>7/15/2020</a:t>
             </a:fld>
             <a:endParaRPr/>
           </a:p>
@@ -10970,7 +10970,7 @@
           <a:p>
             <a:fld id="{402B9795-92DC-40DC-A1CA-9A4B349D7824}" type="datetimeFigureOut">
               <a:rPr lang="en-US" smtClean="0"/>
-              <a:t>7/14/2020</a:t>
+              <a:t>7/15/2020</a:t>
             </a:fld>
             <a:endParaRPr/>
           </a:p>
@@ -11279,7 +11279,7 @@
           <a:p>
             <a:fld id="{402B9795-92DC-40DC-A1CA-9A4B349D7824}" type="datetimeFigureOut">
               <a:rPr lang="en-US" smtClean="0"/>
-              <a:t>7/14/2020</a:t>
+              <a:t>7/15/2020</a:t>
             </a:fld>
             <a:endParaRPr/>
           </a:p>
@@ -11453,7 +11453,7 @@
           <a:p>
             <a:fld id="{402B9795-92DC-40DC-A1CA-9A4B349D7824}" type="datetimeFigureOut">
               <a:rPr lang="en-US" smtClean="0"/>
-              <a:t>7/14/2020</a:t>
+              <a:t>7/15/2020</a:t>
             </a:fld>
             <a:endParaRPr/>
           </a:p>
@@ -11637,7 +11637,7 @@
           <a:p>
             <a:fld id="{402B9795-92DC-40DC-A1CA-9A4B349D7824}" type="datetimeFigureOut">
               <a:rPr lang="en-US" smtClean="0"/>
-              <a:t>7/14/2020</a:t>
+              <a:t>7/15/2020</a:t>
             </a:fld>
             <a:endParaRPr/>
           </a:p>
@@ -11898,7 +11898,7 @@
           <a:p>
             <a:fld id="{402B9795-92DC-40DC-A1CA-9A4B349D7824}" type="datetimeFigureOut">
               <a:rPr lang="en-US" smtClean="0"/>
-              <a:t>7/14/2020</a:t>
+              <a:t>7/15/2020</a:t>
             </a:fld>
             <a:endParaRPr/>
           </a:p>
@@ -12879,7 +12879,7 @@
           <a:p>
             <a:fld id="{402B9795-92DC-40DC-A1CA-9A4B349D7824}" type="datetimeFigureOut">
               <a:rPr lang="en-US" smtClean="0"/>
-              <a:t>7/14/2020</a:t>
+              <a:t>7/15/2020</a:t>
             </a:fld>
             <a:endParaRPr/>
           </a:p>
@@ -13175,7 +13175,7 @@
           <a:p>
             <a:fld id="{402B9795-92DC-40DC-A1CA-9A4B349D7824}" type="datetimeFigureOut">
               <a:rPr lang="en-US" smtClean="0"/>
-              <a:t>7/14/2020</a:t>
+              <a:t>7/15/2020</a:t>
             </a:fld>
             <a:endParaRPr/>
           </a:p>
@@ -13539,7 +13539,7 @@
           <a:p>
             <a:fld id="{402B9795-92DC-40DC-A1CA-9A4B349D7824}" type="datetimeFigureOut">
               <a:rPr lang="en-US" smtClean="0"/>
-              <a:t>7/14/2020</a:t>
+              <a:t>7/15/2020</a:t>
             </a:fld>
             <a:endParaRPr/>
           </a:p>
@@ -13667,7 +13667,7 @@
           <a:p>
             <a:fld id="{402B9795-92DC-40DC-A1CA-9A4B349D7824}" type="datetimeFigureOut">
               <a:rPr lang="en-US" smtClean="0"/>
-              <a:t>7/14/2020</a:t>
+              <a:t>7/15/2020</a:t>
             </a:fld>
             <a:endParaRPr/>
           </a:p>
@@ -13774,7 +13774,7 @@
           <a:p>
             <a:fld id="{402B9795-92DC-40DC-A1CA-9A4B349D7824}" type="datetimeFigureOut">
               <a:rPr lang="en-US" smtClean="0"/>
-              <a:t>7/14/2020</a:t>
+              <a:t>7/15/2020</a:t>
             </a:fld>
             <a:endParaRPr/>
           </a:p>
@@ -14056,7 +14056,7 @@
           <a:p>
             <a:fld id="{402B9795-92DC-40DC-A1CA-9A4B349D7824}" type="datetimeFigureOut">
               <a:rPr lang="en-US" smtClean="0"/>
-              <a:t>7/14/2020</a:t>
+              <a:t>7/15/2020</a:t>
             </a:fld>
             <a:endParaRPr/>
           </a:p>
@@ -14298,7 +14298,7 @@
             <a:fld id="{402B9795-92DC-40DC-A1CA-9A4B349D7824}" type="datetimeFigureOut">
               <a:rPr lang="en-US" smtClean="0"/>
               <a:pPr/>
-              <a:t>7/14/2020</a:t>
+              <a:t>7/15/2020</a:t>
             </a:fld>
             <a:endParaRPr lang="en-US"/>
           </a:p>
@@ -15155,6 +15155,13 @@
       </p:transition>
     </mc:Fallback>
   </mc:AlternateContent>
+  <p:timing>
+    <p:tnLst>
+      <p:par>
+        <p:cTn id="1" dur="indefinite" restart="never" nodeType="tmRoot"/>
+      </p:par>
+    </p:tnLst>
+  </p:timing>
 </p:sld>
 </file>
 
@@ -15242,6 +15249,29 @@
           </a:ln>
         </p:spPr>
       </p:pic>
+      <p:sp>
+        <p:nvSpPr>
+          <p:cNvPr id="6" name="Slide Number Placeholder 5"/>
+          <p:cNvSpPr>
+            <a:spLocks noGrp="1"/>
+          </p:cNvSpPr>
+          <p:nvPr>
+            <p:ph type="sldNum" sz="quarter" idx="12"/>
+          </p:nvPr>
+        </p:nvSpPr>
+        <p:spPr/>
+        <p:txBody>
+          <a:bodyPr/>
+          <a:lstStyle/>
+          <a:p>
+            <a:fld id="{0FF54DE5-C571-48E8-A5BC-B369434E2F44}" type="slidenum">
+              <a:rPr lang="en-US" smtClean="0"/>
+              <a:t>10</a:t>
+            </a:fld>
+            <a:endParaRPr lang="en-US"/>
+          </a:p>
+        </p:txBody>
+      </p:sp>
     </p:spTree>
     <p:extLst>
       <p:ext uri="{BB962C8B-B14F-4D97-AF65-F5344CB8AC3E}">
@@ -15449,6 +15479,29 @@
           </a:prstGeom>
         </p:spPr>
       </p:pic>
+      <p:sp>
+        <p:nvSpPr>
+          <p:cNvPr id="7" name="Slide Number Placeholder 6"/>
+          <p:cNvSpPr>
+            <a:spLocks noGrp="1"/>
+          </p:cNvSpPr>
+          <p:nvPr>
+            <p:ph type="sldNum" sz="quarter" idx="12"/>
+          </p:nvPr>
+        </p:nvSpPr>
+        <p:spPr/>
+        <p:txBody>
+          <a:bodyPr/>
+          <a:lstStyle/>
+          <a:p>
+            <a:fld id="{0FF54DE5-C571-48E8-A5BC-B369434E2F44}" type="slidenum">
+              <a:rPr lang="en-US" smtClean="0"/>
+              <a:t>11</a:t>
+            </a:fld>
+            <a:endParaRPr lang="en-US"/>
+          </a:p>
+        </p:txBody>
+      </p:sp>
     </p:spTree>
     <p:extLst>
       <p:ext uri="{BB962C8B-B14F-4D97-AF65-F5344CB8AC3E}">
@@ -15656,6 +15709,29 @@
           </a:prstGeom>
         </p:spPr>
       </p:pic>
+      <p:sp>
+        <p:nvSpPr>
+          <p:cNvPr id="8" name="Slide Number Placeholder 7"/>
+          <p:cNvSpPr>
+            <a:spLocks noGrp="1"/>
+          </p:cNvSpPr>
+          <p:nvPr>
+            <p:ph type="sldNum" sz="quarter" idx="12"/>
+          </p:nvPr>
+        </p:nvSpPr>
+        <p:spPr/>
+        <p:txBody>
+          <a:bodyPr/>
+          <a:lstStyle/>
+          <a:p>
+            <a:fld id="{0FF54DE5-C571-48E8-A5BC-B369434E2F44}" type="slidenum">
+              <a:rPr lang="en-US" smtClean="0"/>
+              <a:t>12</a:t>
+            </a:fld>
+            <a:endParaRPr lang="en-US"/>
+          </a:p>
+        </p:txBody>
+      </p:sp>
     </p:spTree>
     <p:extLst>
       <p:ext uri="{BB962C8B-B14F-4D97-AF65-F5344CB8AC3E}">
@@ -15779,6 +15855,29 @@
               <a:latin typeface="Times New Roman"/>
               <a:cs typeface="Times New Roman"/>
             </a:endParaRPr>
+          </a:p>
+        </p:txBody>
+      </p:sp>
+      <p:sp>
+        <p:nvSpPr>
+          <p:cNvPr id="7" name="Slide Number Placeholder 6"/>
+          <p:cNvSpPr>
+            <a:spLocks noGrp="1"/>
+          </p:cNvSpPr>
+          <p:nvPr>
+            <p:ph type="sldNum" sz="quarter" idx="12"/>
+          </p:nvPr>
+        </p:nvSpPr>
+        <p:spPr/>
+        <p:txBody>
+          <a:bodyPr/>
+          <a:lstStyle/>
+          <a:p>
+            <a:fld id="{0FF54DE5-C571-48E8-A5BC-B369434E2F44}" type="slidenum">
+              <a:rPr lang="en-US" smtClean="0"/>
+              <a:t>13</a:t>
+            </a:fld>
+            <a:endParaRPr lang="en-US"/>
           </a:p>
         </p:txBody>
       </p:sp>
@@ -15980,6 +16079,29 @@
           </a:p>
           <a:p>
             <a:endParaRPr lang="vi-VN" dirty="0"/>
+          </a:p>
+        </p:txBody>
+      </p:sp>
+      <p:sp>
+        <p:nvSpPr>
+          <p:cNvPr id="7" name="Slide Number Placeholder 6"/>
+          <p:cNvSpPr>
+            <a:spLocks noGrp="1"/>
+          </p:cNvSpPr>
+          <p:nvPr>
+            <p:ph type="sldNum" sz="quarter" idx="12"/>
+          </p:nvPr>
+        </p:nvSpPr>
+        <p:spPr/>
+        <p:txBody>
+          <a:bodyPr/>
+          <a:lstStyle/>
+          <a:p>
+            <a:fld id="{0FF54DE5-C571-48E8-A5BC-B369434E2F44}" type="slidenum">
+              <a:rPr lang="en-US" smtClean="0"/>
+              <a:t>14</a:t>
+            </a:fld>
+            <a:endParaRPr lang="en-US"/>
           </a:p>
         </p:txBody>
       </p:sp>
@@ -16235,6 +16357,29 @@
           </a:p>
         </p:txBody>
       </p:sp>
+      <p:sp>
+        <p:nvSpPr>
+          <p:cNvPr id="7" name="Slide Number Placeholder 6"/>
+          <p:cNvSpPr>
+            <a:spLocks noGrp="1"/>
+          </p:cNvSpPr>
+          <p:nvPr>
+            <p:ph type="sldNum" sz="quarter" idx="12"/>
+          </p:nvPr>
+        </p:nvSpPr>
+        <p:spPr/>
+        <p:txBody>
+          <a:bodyPr/>
+          <a:lstStyle/>
+          <a:p>
+            <a:fld id="{0FF54DE5-C571-48E8-A5BC-B369434E2F44}" type="slidenum">
+              <a:rPr lang="en-US" smtClean="0"/>
+              <a:t>15</a:t>
+            </a:fld>
+            <a:endParaRPr lang="en-US"/>
+          </a:p>
+        </p:txBody>
+      </p:sp>
     </p:spTree>
     <p:extLst>
       <p:ext uri="{BB962C8B-B14F-4D97-AF65-F5344CB8AC3E}">
@@ -16487,6 +16632,29 @@
           </a:p>
         </p:txBody>
       </p:sp>
+      <p:sp>
+        <p:nvSpPr>
+          <p:cNvPr id="7" name="Slide Number Placeholder 6"/>
+          <p:cNvSpPr>
+            <a:spLocks noGrp="1"/>
+          </p:cNvSpPr>
+          <p:nvPr>
+            <p:ph type="sldNum" sz="quarter" idx="12"/>
+          </p:nvPr>
+        </p:nvSpPr>
+        <p:spPr/>
+        <p:txBody>
+          <a:bodyPr/>
+          <a:lstStyle/>
+          <a:p>
+            <a:fld id="{0FF54DE5-C571-48E8-A5BC-B369434E2F44}" type="slidenum">
+              <a:rPr lang="en-US" smtClean="0"/>
+              <a:t>16</a:t>
+            </a:fld>
+            <a:endParaRPr lang="en-US"/>
+          </a:p>
+        </p:txBody>
+      </p:sp>
     </p:spTree>
     <p:extLst>
       <p:ext uri="{BB962C8B-B14F-4D97-AF65-F5344CB8AC3E}">
@@ -16989,6 +17157,29 @@
           </a:p>
         </p:txBody>
       </p:sp>
+      <p:sp>
+        <p:nvSpPr>
+          <p:cNvPr id="5" name="Slide Number Placeholder 4"/>
+          <p:cNvSpPr>
+            <a:spLocks noGrp="1"/>
+          </p:cNvSpPr>
+          <p:nvPr>
+            <p:ph type="sldNum" sz="quarter" idx="12"/>
+          </p:nvPr>
+        </p:nvSpPr>
+        <p:spPr/>
+        <p:txBody>
+          <a:bodyPr/>
+          <a:lstStyle/>
+          <a:p>
+            <a:fld id="{0FF54DE5-C571-48E8-A5BC-B369434E2F44}" type="slidenum">
+              <a:rPr lang="en-US" smtClean="0"/>
+              <a:t>2</a:t>
+            </a:fld>
+            <a:endParaRPr lang="en-US" dirty="0"/>
+          </a:p>
+        </p:txBody>
+      </p:sp>
     </p:spTree>
     <p:extLst>
       <p:ext uri="{BB962C8B-B14F-4D97-AF65-F5344CB8AC3E}">
@@ -17011,6 +17202,13 @@
       </p:transition>
     </mc:Fallback>
   </mc:AlternateContent>
+  <p:timing>
+    <p:tnLst>
+      <p:par>
+        <p:cTn id="1" dur="indefinite" restart="never" nodeType="tmRoot"/>
+      </p:par>
+    </p:tnLst>
+  </p:timing>
 </p:sld>
 </file>
 
@@ -17864,6 +18062,29 @@
           <a:p>
             <a:pPr algn="l"/>
             <a:endParaRPr lang="vi-VN" dirty="0"/>
+          </a:p>
+        </p:txBody>
+      </p:sp>
+      <p:sp>
+        <p:nvSpPr>
+          <p:cNvPr id="12" name="Slide Number Placeholder 11"/>
+          <p:cNvSpPr>
+            <a:spLocks noGrp="1"/>
+          </p:cNvSpPr>
+          <p:nvPr>
+            <p:ph type="sldNum" sz="quarter" idx="12"/>
+          </p:nvPr>
+        </p:nvSpPr>
+        <p:spPr/>
+        <p:txBody>
+          <a:bodyPr/>
+          <a:lstStyle/>
+          <a:p>
+            <a:fld id="{0FF54DE5-C571-48E8-A5BC-B369434E2F44}" type="slidenum">
+              <a:rPr lang="en-US" smtClean="0"/>
+              <a:t>3</a:t>
+            </a:fld>
+            <a:endParaRPr lang="en-US"/>
           </a:p>
         </p:txBody>
       </p:sp>
@@ -18824,6 +19045,29 @@
           </a:p>
         </p:txBody>
       </p:sp>
+      <p:sp>
+        <p:nvSpPr>
+          <p:cNvPr id="9" name="Slide Number Placeholder 8"/>
+          <p:cNvSpPr>
+            <a:spLocks noGrp="1"/>
+          </p:cNvSpPr>
+          <p:nvPr>
+            <p:ph type="sldNum" sz="quarter" idx="12"/>
+          </p:nvPr>
+        </p:nvSpPr>
+        <p:spPr/>
+        <p:txBody>
+          <a:bodyPr/>
+          <a:lstStyle/>
+          <a:p>
+            <a:fld id="{0FF54DE5-C571-48E8-A5BC-B369434E2F44}" type="slidenum">
+              <a:rPr lang="en-US" smtClean="0"/>
+              <a:t>4</a:t>
+            </a:fld>
+            <a:endParaRPr lang="en-US"/>
+          </a:p>
+        </p:txBody>
+      </p:sp>
     </p:spTree>
     <p:extLst>
       <p:ext uri="{BB962C8B-B14F-4D97-AF65-F5344CB8AC3E}">
@@ -19330,6 +19574,29 @@
           </a:p>
         </p:txBody>
       </p:sp>
+      <p:sp>
+        <p:nvSpPr>
+          <p:cNvPr id="8" name="Slide Number Placeholder 7"/>
+          <p:cNvSpPr>
+            <a:spLocks noGrp="1"/>
+          </p:cNvSpPr>
+          <p:nvPr>
+            <p:ph type="sldNum" sz="quarter" idx="12"/>
+          </p:nvPr>
+        </p:nvSpPr>
+        <p:spPr/>
+        <p:txBody>
+          <a:bodyPr/>
+          <a:lstStyle/>
+          <a:p>
+            <a:fld id="{0FF54DE5-C571-48E8-A5BC-B369434E2F44}" type="slidenum">
+              <a:rPr lang="en-US" smtClean="0"/>
+              <a:t>5</a:t>
+            </a:fld>
+            <a:endParaRPr lang="en-US"/>
+          </a:p>
+        </p:txBody>
+      </p:sp>
     </p:spTree>
     <p:extLst>
       <p:ext uri="{BB962C8B-B14F-4D97-AF65-F5344CB8AC3E}">
@@ -20245,6 +20512,29 @@
               </a:rPr>
               <a:t>xoá</a:t>
             </a:r>
+          </a:p>
+        </p:txBody>
+      </p:sp>
+      <p:sp>
+        <p:nvSpPr>
+          <p:cNvPr id="8" name="Slide Number Placeholder 7"/>
+          <p:cNvSpPr>
+            <a:spLocks noGrp="1"/>
+          </p:cNvSpPr>
+          <p:nvPr>
+            <p:ph type="sldNum" sz="quarter" idx="12"/>
+          </p:nvPr>
+        </p:nvSpPr>
+        <p:spPr/>
+        <p:txBody>
+          <a:bodyPr/>
+          <a:lstStyle/>
+          <a:p>
+            <a:fld id="{0FF54DE5-C571-48E8-A5BC-B369434E2F44}" type="slidenum">
+              <a:rPr lang="en-US" smtClean="0"/>
+              <a:t>6</a:t>
+            </a:fld>
+            <a:endParaRPr lang="en-US"/>
           </a:p>
         </p:txBody>
       </p:sp>
@@ -20640,6 +20930,29 @@
           </a:prstGeom>
         </p:spPr>
       </p:pic>
+      <p:sp>
+        <p:nvSpPr>
+          <p:cNvPr id="8" name="Slide Number Placeholder 7"/>
+          <p:cNvSpPr>
+            <a:spLocks noGrp="1"/>
+          </p:cNvSpPr>
+          <p:nvPr>
+            <p:ph type="sldNum" sz="quarter" idx="12"/>
+          </p:nvPr>
+        </p:nvSpPr>
+        <p:spPr/>
+        <p:txBody>
+          <a:bodyPr/>
+          <a:lstStyle/>
+          <a:p>
+            <a:fld id="{0FF54DE5-C571-48E8-A5BC-B369434E2F44}" type="slidenum">
+              <a:rPr lang="en-US" smtClean="0"/>
+              <a:t>7</a:t>
+            </a:fld>
+            <a:endParaRPr lang="en-US"/>
+          </a:p>
+        </p:txBody>
+      </p:sp>
     </p:spTree>
     <p:extLst>
       <p:ext uri="{BB962C8B-B14F-4D97-AF65-F5344CB8AC3E}">
@@ -20998,6 +21311,29 @@
           </a:prstGeom>
         </p:spPr>
       </p:pic>
+      <p:sp>
+        <p:nvSpPr>
+          <p:cNvPr id="8" name="Slide Number Placeholder 7"/>
+          <p:cNvSpPr>
+            <a:spLocks noGrp="1"/>
+          </p:cNvSpPr>
+          <p:nvPr>
+            <p:ph type="sldNum" sz="quarter" idx="12"/>
+          </p:nvPr>
+        </p:nvSpPr>
+        <p:spPr/>
+        <p:txBody>
+          <a:bodyPr/>
+          <a:lstStyle/>
+          <a:p>
+            <a:fld id="{0FF54DE5-C571-48E8-A5BC-B369434E2F44}" type="slidenum">
+              <a:rPr lang="en-US" smtClean="0"/>
+              <a:t>8</a:t>
+            </a:fld>
+            <a:endParaRPr lang="en-US"/>
+          </a:p>
+        </p:txBody>
+      </p:sp>
     </p:spTree>
     <p:extLst>
       <p:ext uri="{BB962C8B-B14F-4D97-AF65-F5344CB8AC3E}">
@@ -21296,6 +21632,29 @@
           </a:prstGeom>
         </p:spPr>
       </p:pic>
+      <p:sp>
+        <p:nvSpPr>
+          <p:cNvPr id="8" name="Slide Number Placeholder 7"/>
+          <p:cNvSpPr>
+            <a:spLocks noGrp="1"/>
+          </p:cNvSpPr>
+          <p:nvPr>
+            <p:ph type="sldNum" sz="quarter" idx="12"/>
+          </p:nvPr>
+        </p:nvSpPr>
+        <p:spPr/>
+        <p:txBody>
+          <a:bodyPr/>
+          <a:lstStyle/>
+          <a:p>
+            <a:fld id="{0FF54DE5-C571-48E8-A5BC-B369434E2F44}" type="slidenum">
+              <a:rPr lang="en-US" smtClean="0"/>
+              <a:t>9</a:t>
+            </a:fld>
+            <a:endParaRPr lang="en-US"/>
+          </a:p>
+        </p:txBody>
+      </p:sp>
     </p:spTree>
     <p:extLst>
       <p:ext uri="{BB962C8B-B14F-4D97-AF65-F5344CB8AC3E}">

</xml_diff>